<commit_message>
minor change to Session 6 slides
</commit_message>
<xml_diff>
--- a/Session06/Session6_Slides.pptx
+++ b/Session06/Session6_Slides.pptx
@@ -9787,7 +9787,7 @@
           </a:ln>
           <a:extLst>
             <a:ext uri="{C572A759-6A51-4108-AA02-DFA0A04FC94B}">
-              <ma14:wrappingTextBoxFlag xmlns="" xmlns:ma14="http://schemas.microsoft.com/office/mac/drawingml/2011/main" val="1"/>
+              <ma14:wrappingTextBoxFlag xmlns:ma14="http://schemas.microsoft.com/office/mac/drawingml/2011/main" xmlns="" val="1"/>
             </a:ext>
           </a:extLst>
         </p:spPr>
@@ -9826,7 +9826,7 @@
           </a:ln>
           <a:extLst>
             <a:ext uri="{C572A759-6A51-4108-AA02-DFA0A04FC94B}">
-              <ma14:wrappingTextBoxFlag xmlns="" xmlns:ma14="http://schemas.microsoft.com/office/mac/drawingml/2011/main" val="1"/>
+              <ma14:wrappingTextBoxFlag xmlns:ma14="http://schemas.microsoft.com/office/mac/drawingml/2011/main" xmlns="" val="1"/>
             </a:ext>
           </a:extLst>
         </p:spPr>
@@ -10890,7 +10890,7 @@
           </a:ln>
           <a:extLst>
             <a:ext uri="{C572A759-6A51-4108-AA02-DFA0A04FC94B}">
-              <ma14:wrappingTextBoxFlag xmlns:ma14="http://schemas.microsoft.com/office/mac/drawingml/2011/main" xmlns="" val="1"/>
+              <ma14:wrappingTextBoxFlag xmlns="" xmlns:ma14="http://schemas.microsoft.com/office/mac/drawingml/2011/main" val="1"/>
             </a:ext>
           </a:extLst>
         </p:spPr>
@@ -10929,7 +10929,7 @@
           </a:ln>
           <a:extLst>
             <a:ext uri="{C572A759-6A51-4108-AA02-DFA0A04FC94B}">
-              <ma14:wrappingTextBoxFlag xmlns:ma14="http://schemas.microsoft.com/office/mac/drawingml/2011/main" xmlns="" val="1"/>
+              <ma14:wrappingTextBoxFlag xmlns="" xmlns:ma14="http://schemas.microsoft.com/office/mac/drawingml/2011/main" val="1"/>
             </a:ext>
           </a:extLst>
         </p:spPr>
@@ -12221,7 +12221,7 @@
           </a:ln>
           <a:extLst>
             <a:ext uri="{C572A759-6A51-4108-AA02-DFA0A04FC94B}">
-              <ma14:wrappingTextBoxFlag xmlns:ma14="http://schemas.microsoft.com/office/mac/drawingml/2011/main" xmlns="" val="1"/>
+              <ma14:wrappingTextBoxFlag xmlns="" xmlns:ma14="http://schemas.microsoft.com/office/mac/drawingml/2011/main" val="1"/>
             </a:ext>
           </a:extLst>
         </p:spPr>
@@ -12350,7 +12350,7 @@
               </a:buBlip>
               <a:defRPr sz="6336"/>
             </a:pPr>
-            <a:endParaRPr/>
+            <a:endParaRPr dirty="0"/>
           </a:p>
           <a:p>
             <a:pPr marL="698910" indent="-698910" defTabSz="578358">
@@ -12366,7 +12366,12 @@
               <a:defRPr sz="6336"/>
             </a:pPr>
             <a:r>
-              <a:t>Numpy array with fancy index</a:t>
+              <a:rPr dirty="0" err="1"/>
+              <a:t>Numpy</a:t>
+            </a:r>
+            <a:r>
+              <a:rPr dirty="0"/>
+              <a:t> array with fancy index</a:t>
             </a:r>
           </a:p>
           <a:p>
@@ -12383,6 +12388,7 @@
               <a:defRPr sz="6336"/>
             </a:pPr>
             <a:r>
+              <a:rPr dirty="0"/>
               <a:t>Can still use Boolean indexing!</a:t>
             </a:r>
           </a:p>
@@ -12469,7 +12475,7 @@
           </a:ln>
           <a:extLst>
             <a:ext uri="{C572A759-6A51-4108-AA02-DFA0A04FC94B}">
-              <ma14:wrappingTextBoxFlag xmlns:ma14="http://schemas.microsoft.com/office/mac/drawingml/2011/main" xmlns="" val="1"/>
+              <ma14:wrappingTextBoxFlag xmlns="" xmlns:ma14="http://schemas.microsoft.com/office/mac/drawingml/2011/main" val="1"/>
             </a:ext>
           </a:extLst>
         </p:spPr>
@@ -12488,7 +12494,20 @@
               </a:defRPr>
             </a:pPr>
             <a:r>
-              <a:t>df[df[“SCORE”] &gt; 30]</a:t>
+              <a:rPr dirty="0" err="1"/>
+              <a:t>df</a:t>
+            </a:r>
+            <a:r>
+              <a:rPr dirty="0"/>
+              <a:t>[</a:t>
+            </a:r>
+            <a:r>
+              <a:rPr dirty="0" err="1"/>
+              <a:t>df</a:t>
+            </a:r>
+            <a:r>
+              <a:rPr dirty="0"/>
+              <a:t>[“SCORE”] &gt; 30]</a:t>
             </a:r>
           </a:p>
           <a:p>
@@ -12501,6 +12520,7 @@
               </a:defRPr>
             </a:pPr>
             <a:r>
+              <a:rPr dirty="0"/>
               <a:t> </a:t>
             </a:r>
           </a:p>
@@ -12587,7 +12607,7 @@
           </a:ln>
           <a:extLst>
             <a:ext uri="{C572A759-6A51-4108-AA02-DFA0A04FC94B}">
-              <ma14:wrappingTextBoxFlag xmlns:ma14="http://schemas.microsoft.com/office/mac/drawingml/2011/main" xmlns="" val="1"/>
+              <ma14:wrappingTextBoxFlag xmlns="" xmlns:ma14="http://schemas.microsoft.com/office/mac/drawingml/2011/main" val="1"/>
             </a:ext>
           </a:extLst>
         </p:spPr>
@@ -12705,7 +12725,7 @@
           </a:ln>
           <a:extLst>
             <a:ext uri="{C572A759-6A51-4108-AA02-DFA0A04FC94B}">
-              <ma14:wrappingTextBoxFlag xmlns:ma14="http://schemas.microsoft.com/office/mac/drawingml/2011/main" xmlns="" val="1"/>
+              <ma14:wrappingTextBoxFlag xmlns="" xmlns:ma14="http://schemas.microsoft.com/office/mac/drawingml/2011/main" val="1"/>
             </a:ext>
           </a:extLst>
         </p:spPr>
@@ -12849,7 +12869,7 @@
           </a:ln>
           <a:extLst>
             <a:ext uri="{C572A759-6A51-4108-AA02-DFA0A04FC94B}">
-              <ma14:wrappingTextBoxFlag xmlns:ma14="http://schemas.microsoft.com/office/mac/drawingml/2011/main" xmlns="" val="1"/>
+              <ma14:wrappingTextBoxFlag xmlns="" xmlns:ma14="http://schemas.microsoft.com/office/mac/drawingml/2011/main" val="1"/>
             </a:ext>
           </a:extLst>
         </p:spPr>
@@ -12967,7 +12987,7 @@
           </a:ln>
           <a:extLst>
             <a:ext uri="{C572A759-6A51-4108-AA02-DFA0A04FC94B}">
-              <ma14:wrappingTextBoxFlag xmlns:ma14="http://schemas.microsoft.com/office/mac/drawingml/2011/main" xmlns="" val="1"/>
+              <ma14:wrappingTextBoxFlag xmlns="" xmlns:ma14="http://schemas.microsoft.com/office/mac/drawingml/2011/main" val="1"/>
             </a:ext>
           </a:extLst>
         </p:spPr>
@@ -13072,7 +13092,7 @@
           </a:ln>
           <a:extLst>
             <a:ext uri="{C572A759-6A51-4108-AA02-DFA0A04FC94B}">
-              <ma14:wrappingTextBoxFlag xmlns:ma14="http://schemas.microsoft.com/office/mac/drawingml/2011/main" xmlns="" val="1"/>
+              <ma14:wrappingTextBoxFlag xmlns="" xmlns:ma14="http://schemas.microsoft.com/office/mac/drawingml/2011/main" val="1"/>
             </a:ext>
           </a:extLst>
         </p:spPr>
@@ -13115,7 +13135,7 @@
           </a:ln>
           <a:extLst>
             <a:ext uri="{C572A759-6A51-4108-AA02-DFA0A04FC94B}">
-              <ma14:wrappingTextBoxFlag xmlns:ma14="http://schemas.microsoft.com/office/mac/drawingml/2011/main" xmlns="" val="1"/>
+              <ma14:wrappingTextBoxFlag xmlns="" xmlns:ma14="http://schemas.microsoft.com/office/mac/drawingml/2011/main" val="1"/>
             </a:ext>
           </a:extLst>
         </p:spPr>
@@ -13158,7 +13178,7 @@
           </a:ln>
           <a:extLst>
             <a:ext uri="{C572A759-6A51-4108-AA02-DFA0A04FC94B}">
-              <ma14:wrappingTextBoxFlag xmlns:ma14="http://schemas.microsoft.com/office/mac/drawingml/2011/main" xmlns="" val="1"/>
+              <ma14:wrappingTextBoxFlag xmlns="" xmlns:ma14="http://schemas.microsoft.com/office/mac/drawingml/2011/main" val="1"/>
             </a:ext>
           </a:extLst>
         </p:spPr>
@@ -13268,6 +13288,7 @@
               <a:defRPr sz="4800"/>
             </a:pPr>
             <a:r>
+              <a:rPr dirty="0"/>
               <a:t>Pandas</a:t>
             </a:r>
           </a:p>
@@ -13276,15 +13297,18 @@
               <a:defRPr sz="4800"/>
             </a:pPr>
             <a:r>
+              <a:rPr dirty="0" err="1"/>
               <a:t>DataFrames</a:t>
             </a:r>
+            <a:endParaRPr dirty="0"/>
           </a:p>
           <a:p>
             <a:pPr marL="444500" indent="-444500">
               <a:defRPr sz="4800"/>
             </a:pPr>
             <a:r>
-              <a:t>dtype </a:t>
+              <a:rPr dirty="0"/>
+              <a:t>.head()</a:t>
             </a:r>
           </a:p>
           <a:p>
@@ -13292,14 +13316,7 @@
               <a:defRPr sz="4800"/>
             </a:pPr>
             <a:r>
-              <a:t>.head()</a:t>
-            </a:r>
-          </a:p>
-          <a:p>
-            <a:pPr marL="444500" indent="-444500">
-              <a:defRPr sz="4800"/>
-            </a:pPr>
-            <a:r>
+              <a:rPr dirty="0"/>
               <a:t>Boolean indexing</a:t>
             </a:r>
           </a:p>
@@ -13589,7 +13606,7 @@
           </a:ln>
           <a:extLst>
             <a:ext uri="{C572A759-6A51-4108-AA02-DFA0A04FC94B}">
-              <ma14:wrappingTextBoxFlag xmlns:ma14="http://schemas.microsoft.com/office/mac/drawingml/2011/main" xmlns="" val="1"/>
+              <ma14:wrappingTextBoxFlag xmlns="" xmlns:ma14="http://schemas.microsoft.com/office/mac/drawingml/2011/main" val="1"/>
             </a:ext>
           </a:extLst>
         </p:spPr>
@@ -13707,7 +13724,7 @@
           </a:ln>
           <a:extLst>
             <a:ext uri="{C572A759-6A51-4108-AA02-DFA0A04FC94B}">
-              <ma14:wrappingTextBoxFlag xmlns:ma14="http://schemas.microsoft.com/office/mac/drawingml/2011/main" xmlns="" val="1"/>
+              <ma14:wrappingTextBoxFlag xmlns="" xmlns:ma14="http://schemas.microsoft.com/office/mac/drawingml/2011/main" val="1"/>
             </a:ext>
           </a:extLst>
         </p:spPr>
@@ -13877,7 +13894,7 @@
           </a:ln>
           <a:extLst>
             <a:ext uri="{C572A759-6A51-4108-AA02-DFA0A04FC94B}">
-              <ma14:wrappingTextBoxFlag xmlns:ma14="http://schemas.microsoft.com/office/mac/drawingml/2011/main" xmlns="" val="1"/>
+              <ma14:wrappingTextBoxFlag xmlns="" xmlns:ma14="http://schemas.microsoft.com/office/mac/drawingml/2011/main" val="1"/>
             </a:ext>
           </a:extLst>
         </p:spPr>
@@ -14121,7 +14138,7 @@
           </a:ln>
           <a:extLst>
             <a:ext uri="{C572A759-6A51-4108-AA02-DFA0A04FC94B}">
-              <ma14:wrappingTextBoxFlag xmlns:ma14="http://schemas.microsoft.com/office/mac/drawingml/2011/main" xmlns="" val="1"/>
+              <ma14:wrappingTextBoxFlag xmlns="" xmlns:ma14="http://schemas.microsoft.com/office/mac/drawingml/2011/main" val="1"/>
             </a:ext>
           </a:extLst>
         </p:spPr>
@@ -14254,7 +14271,7 @@
           </a:ln>
           <a:extLst>
             <a:ext uri="{C572A759-6A51-4108-AA02-DFA0A04FC94B}">
-              <ma14:wrappingTextBoxFlag xmlns:ma14="http://schemas.microsoft.com/office/mac/drawingml/2011/main" xmlns="" val="1"/>
+              <ma14:wrappingTextBoxFlag xmlns="" xmlns:ma14="http://schemas.microsoft.com/office/mac/drawingml/2011/main" val="1"/>
             </a:ext>
           </a:extLst>
         </p:spPr>
@@ -14360,7 +14377,7 @@
           </a:ln>
           <a:extLst>
             <a:ext uri="{C572A759-6A51-4108-AA02-DFA0A04FC94B}">
-              <ma14:wrappingTextBoxFlag xmlns:ma14="http://schemas.microsoft.com/office/mac/drawingml/2011/main" xmlns="" val="1"/>
+              <ma14:wrappingTextBoxFlag xmlns="" xmlns:ma14="http://schemas.microsoft.com/office/mac/drawingml/2011/main" val="1"/>
             </a:ext>
           </a:extLst>
         </p:spPr>
@@ -14480,7 +14497,7 @@
           </a:ln>
           <a:extLst>
             <a:ext uri="{C572A759-6A51-4108-AA02-DFA0A04FC94B}">
-              <ma14:wrappingTextBoxFlag xmlns:ma14="http://schemas.microsoft.com/office/mac/drawingml/2011/main" xmlns="" val="1"/>
+              <ma14:wrappingTextBoxFlag xmlns="" xmlns:ma14="http://schemas.microsoft.com/office/mac/drawingml/2011/main" val="1"/>
             </a:ext>
           </a:extLst>
         </p:spPr>
@@ -15620,7 +15637,7 @@
           </a:ln>
           <a:extLst>
             <a:ext uri="{C572A759-6A51-4108-AA02-DFA0A04FC94B}">
-              <ma14:wrappingTextBoxFlag xmlns:ma14="http://schemas.microsoft.com/office/mac/drawingml/2011/main" xmlns="" val="1"/>
+              <ma14:wrappingTextBoxFlag xmlns="" xmlns:ma14="http://schemas.microsoft.com/office/mac/drawingml/2011/main" val="1"/>
             </a:ext>
           </a:extLst>
         </p:spPr>
@@ -15733,7 +15750,7 @@
           </a:ln>
           <a:extLst>
             <a:ext uri="{C572A759-6A51-4108-AA02-DFA0A04FC94B}">
-              <ma14:wrappingTextBoxFlag xmlns:ma14="http://schemas.microsoft.com/office/mac/drawingml/2011/main" xmlns="" val="1"/>
+              <ma14:wrappingTextBoxFlag xmlns="" xmlns:ma14="http://schemas.microsoft.com/office/mac/drawingml/2011/main" val="1"/>
             </a:ext>
           </a:extLst>
         </p:spPr>
@@ -15846,7 +15863,7 @@
           </a:ln>
           <a:extLst>
             <a:ext uri="{C572A759-6A51-4108-AA02-DFA0A04FC94B}">
-              <ma14:wrappingTextBoxFlag xmlns:ma14="http://schemas.microsoft.com/office/mac/drawingml/2011/main" xmlns="" val="1"/>
+              <ma14:wrappingTextBoxFlag xmlns="" xmlns:ma14="http://schemas.microsoft.com/office/mac/drawingml/2011/main" val="1"/>
             </a:ext>
           </a:extLst>
         </p:spPr>
@@ -15964,7 +15981,7 @@
           </a:ln>
           <a:extLst>
             <a:ext uri="{C572A759-6A51-4108-AA02-DFA0A04FC94B}">
-              <ma14:wrappingTextBoxFlag xmlns:ma14="http://schemas.microsoft.com/office/mac/drawingml/2011/main" xmlns="" val="1"/>
+              <ma14:wrappingTextBoxFlag xmlns="" xmlns:ma14="http://schemas.microsoft.com/office/mac/drawingml/2011/main" val="1"/>
             </a:ext>
           </a:extLst>
         </p:spPr>
@@ -16244,7 +16261,7 @@
           </a:ln>
           <a:extLst>
             <a:ext uri="{C572A759-6A51-4108-AA02-DFA0A04FC94B}">
-              <ma14:wrappingTextBoxFlag xmlns:ma14="http://schemas.microsoft.com/office/mac/drawingml/2011/main" xmlns="" val="1"/>
+              <ma14:wrappingTextBoxFlag xmlns="" xmlns:ma14="http://schemas.microsoft.com/office/mac/drawingml/2011/main" val="1"/>
             </a:ext>
           </a:extLst>
         </p:spPr>
@@ -16351,8 +16368,8 @@
         </p:nvSpPr>
         <p:spPr>
           <a:xfrm>
-            <a:off x="455296" y="4826000"/>
-            <a:ext cx="12192002" cy="1955801"/>
+            <a:off x="455296" y="4813886"/>
+            <a:ext cx="12192002" cy="1980029"/>
           </a:xfrm>
           <a:prstGeom prst="rect">
             <a:avLst/>
@@ -16362,7 +16379,7 @@
           </a:ln>
           <a:extLst>
             <a:ext uri="{C572A759-6A51-4108-AA02-DFA0A04FC94B}">
-              <ma14:wrappingTextBoxFlag xmlns:ma14="http://schemas.microsoft.com/office/mac/drawingml/2011/main" xmlns="" val="1"/>
+              <ma14:wrappingTextBoxFlag xmlns="" xmlns:ma14="http://schemas.microsoft.com/office/mac/drawingml/2011/main" val="1"/>
             </a:ext>
           </a:extLst>
         </p:spPr>
@@ -16381,7 +16398,12 @@
               </a:defRPr>
             </a:pPr>
             <a:r>
-              <a:t>new_df.head()</a:t>
+              <a:rPr dirty="0" err="1"/>
+              <a:t>df.head</a:t>
+            </a:r>
+            <a:r>
+              <a:rPr dirty="0"/>
+              <a:t>()</a:t>
             </a:r>
           </a:p>
           <a:p>
@@ -16394,6 +16416,7 @@
               </a:defRPr>
             </a:pPr>
             <a:r>
+              <a:rPr dirty="0"/>
               <a:t> </a:t>
             </a:r>
           </a:p>

</xml_diff>